<commit_message>
modify some details about lecture02
</commit_message>
<xml_diff>
--- a/Lecture02/零基础动手学Python-第一讲-查永春.pptx
+++ b/Lecture02/零基础动手学Python-第一讲-查永春.pptx
@@ -284,7 +284,7 @@
           <a:p>
             <a:fld id="{717742FC-62BB-4B81-9CA5-3B750A4B4580}" type="datetimeFigureOut">
               <a:rPr lang="zh-CN" altLang="en-US" smtClean="0"/>
-              <a:t>2019/12/8</a:t>
+              <a:t>2020/2/10</a:t>
             </a:fld>
             <a:endParaRPr lang="zh-CN" altLang="en-US"/>
           </a:p>
@@ -450,7 +450,7 @@
             </a:pPr>
             <a:fld id="{06024D97-E667-405D-B634-E583E2108D71}" type="datetimeFigureOut">
               <a:rPr lang="zh-CN" altLang="en-US"/>
-              <a:t>2019/12/8</a:t>
+              <a:t>2020/2/10</a:t>
             </a:fld>
             <a:endParaRPr lang="zh-CN" altLang="en-US"/>
           </a:p>
@@ -2272,7 +2272,7 @@
           <a:p>
             <a:fld id="{43A93E93-166D-47F5-9EF1-ACEABE24AEEA}" type="datetimeFigureOut">
               <a:rPr lang="zh-CN" altLang="en-US" smtClean="0"/>
-              <a:t>2019/12/8</a:t>
+              <a:t>2020/2/10</a:t>
             </a:fld>
             <a:endParaRPr lang="zh-CN" altLang="en-US"/>
           </a:p>
@@ -5388,7 +5388,7 @@
               <a:t>setuptools</a:t>
             </a:r>
             <a:r>
-              <a:rPr lang="en-US" altLang="zh-CN" sz="2000" dirty="0">
+              <a:rPr lang="en-US" altLang="zh-CN" sz="2000">
                 <a:solidFill>
                   <a:schemeClr val="accent1">
                     <a:lumMod val="75000"/>
@@ -5397,8 +5397,17 @@
                 <a:latin typeface="黑体" panose="02010609060101010101" pitchFamily="49" charset="-122"/>
                 <a:cs typeface="+mn-ea"/>
               </a:rPr>
-              <a:t> –upgrade</a:t>
+              <a:t> --upgrade</a:t>
             </a:r>
+            <a:endParaRPr lang="en-US" altLang="zh-CN" sz="2000" dirty="0">
+              <a:solidFill>
+                <a:schemeClr val="accent1">
+                  <a:lumMod val="75000"/>
+                </a:schemeClr>
+              </a:solidFill>
+              <a:latin typeface="黑体" panose="02010609060101010101" pitchFamily="49" charset="-122"/>
+              <a:cs typeface="+mn-ea"/>
+            </a:endParaRPr>
           </a:p>
           <a:p>
             <a:pPr marL="342900" indent="-342900" defTabSz="963930">

</xml_diff>